<commit_message>
info popup, first filter dropdown tries, main font
</commit_message>
<xml_diff>
--- a/public/Iconset.pptx
+++ b/public/Iconset.pptx
@@ -5,7 +5,7 @@
     <p:sldMasterId id="2147483648" r:id="rId1"/>
   </p:sldMasterIdLst>
   <p:notesMasterIdLst>
-    <p:notesMasterId r:id="rId7"/>
+    <p:notesMasterId r:id="rId8"/>
   </p:notesMasterIdLst>
   <p:sldIdLst>
     <p:sldId id="256" r:id="rId2"/>
@@ -13,6 +13,7 @@
     <p:sldId id="259" r:id="rId4"/>
     <p:sldId id="260" r:id="rId5"/>
     <p:sldId id="261" r:id="rId6"/>
+    <p:sldId id="262" r:id="rId7"/>
   </p:sldIdLst>
   <p:sldSz cx="12192000" cy="6858000"/>
   <p:notesSz cx="6858000" cy="9144000"/>
@@ -3884,6 +3885,134 @@
     <p:extLst>
       <p:ext uri="{BB962C8B-B14F-4D97-AF65-F5344CB8AC3E}">
         <p14:creationId xmlns:p14="http://schemas.microsoft.com/office/powerpoint/2010/main" val="291501420"/>
+      </p:ext>
+    </p:extLst>
+  </p:cSld>
+  <p:clrMapOvr>
+    <a:masterClrMapping/>
+  </p:clrMapOvr>
+</p:sld>
+</file>
+
+<file path=ppt/slides/slide6.xml><?xml version="1.0" encoding="utf-8"?>
+<p:sld xmlns:a="http://schemas.openxmlformats.org/drawingml/2006/main" xmlns:r="http://schemas.openxmlformats.org/officeDocument/2006/relationships" xmlns:p="http://schemas.openxmlformats.org/presentationml/2006/main">
+  <p:cSld>
+    <p:spTree>
+      <p:nvGrpSpPr>
+        <p:cNvPr id="1" name=""/>
+        <p:cNvGrpSpPr/>
+        <p:nvPr/>
+      </p:nvGrpSpPr>
+      <p:grpSpPr>
+        <a:xfrm>
+          <a:off x="0" y="0"/>
+          <a:ext cx="0" cy="0"/>
+          <a:chOff x="0" y="0"/>
+          <a:chExt cx="0" cy="0"/>
+        </a:xfrm>
+      </p:grpSpPr>
+      <p:sp>
+        <p:nvSpPr>
+          <p:cNvPr id="4" name="Triangle 3"/>
+          <p:cNvSpPr/>
+          <p:nvPr/>
+        </p:nvSpPr>
+        <p:spPr>
+          <a:xfrm>
+            <a:off x="4656368" y="1364693"/>
+            <a:ext cx="3069772" cy="1768926"/>
+          </a:xfrm>
+          <a:prstGeom prst="triangle">
+            <a:avLst/>
+          </a:prstGeom>
+          <a:solidFill>
+            <a:schemeClr val="bg2">
+              <a:lumMod val="25000"/>
+            </a:schemeClr>
+          </a:solidFill>
+          <a:ln>
+            <a:noFill/>
+          </a:ln>
+          <a:effectLst/>
+        </p:spPr>
+        <p:style>
+          <a:lnRef idx="2">
+            <a:schemeClr val="accent1">
+              <a:shade val="50000"/>
+            </a:schemeClr>
+          </a:lnRef>
+          <a:fillRef idx="1">
+            <a:schemeClr val="accent1"/>
+          </a:fillRef>
+          <a:effectRef idx="0">
+            <a:schemeClr val="accent1"/>
+          </a:effectRef>
+          <a:fontRef idx="minor">
+            <a:schemeClr val="lt1"/>
+          </a:fontRef>
+        </p:style>
+        <p:txBody>
+          <a:bodyPr rtlCol="0" anchor="ctr"/>
+          <a:lstStyle/>
+          <a:p>
+            <a:pPr algn="ctr"/>
+            <a:endParaRPr lang="en-US"/>
+          </a:p>
+        </p:txBody>
+      </p:sp>
+      <p:sp>
+        <p:nvSpPr>
+          <p:cNvPr id="5" name="Triangle 4"/>
+          <p:cNvSpPr/>
+          <p:nvPr/>
+        </p:nvSpPr>
+        <p:spPr>
+          <a:xfrm rot="10800000">
+            <a:off x="4656368" y="4049277"/>
+            <a:ext cx="3069772" cy="1768926"/>
+          </a:xfrm>
+          <a:prstGeom prst="triangle">
+            <a:avLst/>
+          </a:prstGeom>
+          <a:solidFill>
+            <a:schemeClr val="bg2">
+              <a:lumMod val="25000"/>
+            </a:schemeClr>
+          </a:solidFill>
+          <a:ln>
+            <a:noFill/>
+          </a:ln>
+          <a:effectLst/>
+        </p:spPr>
+        <p:style>
+          <a:lnRef idx="2">
+            <a:schemeClr val="accent1">
+              <a:shade val="50000"/>
+            </a:schemeClr>
+          </a:lnRef>
+          <a:fillRef idx="1">
+            <a:schemeClr val="accent1"/>
+          </a:fillRef>
+          <a:effectRef idx="0">
+            <a:schemeClr val="accent1"/>
+          </a:effectRef>
+          <a:fontRef idx="minor">
+            <a:schemeClr val="lt1"/>
+          </a:fontRef>
+        </p:style>
+        <p:txBody>
+          <a:bodyPr rtlCol="0" anchor="ctr"/>
+          <a:lstStyle/>
+          <a:p>
+            <a:pPr algn="ctr"/>
+            <a:endParaRPr lang="en-US"/>
+          </a:p>
+        </p:txBody>
+      </p:sp>
+    </p:spTree>
+    <p:extLst>
+      <p:ext uri="{BB962C8B-B14F-4D97-AF65-F5344CB8AC3E}">
+        <p14:creationId xmlns:p14="http://schemas.microsoft.com/office/powerpoint/2010/main" val="261346861"/>
       </p:ext>
     </p:extLst>
   </p:cSld>

</xml_diff>